<commit_message>
implement auto-fit font size
</commit_message>
<xml_diff>
--- a/input.pptx
+++ b/input.pptx
@@ -198,7 +198,7 @@
           <a:p>
             <a:fld id="{35566EA9-F6E4-4DE7-B092-9F710DB1BA06}" type="datetimeFigureOut">
               <a:rPr lang="en-MY" smtClean="0"/>
-              <a:t>27/6/2024</a:t>
+              <a:t>2/7/2024</a:t>
             </a:fld>
             <a:endParaRPr lang="en-MY"/>
           </a:p>
@@ -699,7 +699,7 @@
           <a:p>
             <a:fld id="{46F5D863-C35B-4EA0-8930-BC442A6E9175}" type="datetimeFigureOut">
               <a:rPr lang="en-MY" smtClean="0"/>
-              <a:t>27/6/2024</a:t>
+              <a:t>2/7/2024</a:t>
             </a:fld>
             <a:endParaRPr lang="en-MY"/>
           </a:p>
@@ -899,7 +899,7 @@
           <a:p>
             <a:fld id="{46F5D863-C35B-4EA0-8930-BC442A6E9175}" type="datetimeFigureOut">
               <a:rPr lang="en-MY" smtClean="0"/>
-              <a:t>27/6/2024</a:t>
+              <a:t>2/7/2024</a:t>
             </a:fld>
             <a:endParaRPr lang="en-MY"/>
           </a:p>
@@ -1109,7 +1109,7 @@
           <a:p>
             <a:fld id="{46F5D863-C35B-4EA0-8930-BC442A6E9175}" type="datetimeFigureOut">
               <a:rPr lang="en-MY" smtClean="0"/>
-              <a:t>27/6/2024</a:t>
+              <a:t>2/7/2024</a:t>
             </a:fld>
             <a:endParaRPr lang="en-MY"/>
           </a:p>
@@ -1309,7 +1309,7 @@
           <a:p>
             <a:fld id="{46F5D863-C35B-4EA0-8930-BC442A6E9175}" type="datetimeFigureOut">
               <a:rPr lang="en-MY" smtClean="0"/>
-              <a:t>27/6/2024</a:t>
+              <a:t>2/7/2024</a:t>
             </a:fld>
             <a:endParaRPr lang="en-MY"/>
           </a:p>
@@ -1585,7 +1585,7 @@
           <a:p>
             <a:fld id="{46F5D863-C35B-4EA0-8930-BC442A6E9175}" type="datetimeFigureOut">
               <a:rPr lang="en-MY" smtClean="0"/>
-              <a:t>27/6/2024</a:t>
+              <a:t>2/7/2024</a:t>
             </a:fld>
             <a:endParaRPr lang="en-MY"/>
           </a:p>
@@ -1853,7 +1853,7 @@
           <a:p>
             <a:fld id="{46F5D863-C35B-4EA0-8930-BC442A6E9175}" type="datetimeFigureOut">
               <a:rPr lang="en-MY" smtClean="0"/>
-              <a:t>27/6/2024</a:t>
+              <a:t>2/7/2024</a:t>
             </a:fld>
             <a:endParaRPr lang="en-MY"/>
           </a:p>
@@ -2268,7 +2268,7 @@
           <a:p>
             <a:fld id="{46F5D863-C35B-4EA0-8930-BC442A6E9175}" type="datetimeFigureOut">
               <a:rPr lang="en-MY" smtClean="0"/>
-              <a:t>27/6/2024</a:t>
+              <a:t>2/7/2024</a:t>
             </a:fld>
             <a:endParaRPr lang="en-MY"/>
           </a:p>
@@ -2410,7 +2410,7 @@
           <a:p>
             <a:fld id="{46F5D863-C35B-4EA0-8930-BC442A6E9175}" type="datetimeFigureOut">
               <a:rPr lang="en-MY" smtClean="0"/>
-              <a:t>27/6/2024</a:t>
+              <a:t>2/7/2024</a:t>
             </a:fld>
             <a:endParaRPr lang="en-MY"/>
           </a:p>
@@ -2523,7 +2523,7 @@
           <a:p>
             <a:fld id="{46F5D863-C35B-4EA0-8930-BC442A6E9175}" type="datetimeFigureOut">
               <a:rPr lang="en-MY" smtClean="0"/>
-              <a:t>27/6/2024</a:t>
+              <a:t>2/7/2024</a:t>
             </a:fld>
             <a:endParaRPr lang="en-MY"/>
           </a:p>
@@ -2836,7 +2836,7 @@
           <a:p>
             <a:fld id="{46F5D863-C35B-4EA0-8930-BC442A6E9175}" type="datetimeFigureOut">
               <a:rPr lang="en-MY" smtClean="0"/>
-              <a:t>27/6/2024</a:t>
+              <a:t>2/7/2024</a:t>
             </a:fld>
             <a:endParaRPr lang="en-MY"/>
           </a:p>
@@ -3125,7 +3125,7 @@
           <a:p>
             <a:fld id="{46F5D863-C35B-4EA0-8930-BC442A6E9175}" type="datetimeFigureOut">
               <a:rPr lang="en-MY" smtClean="0"/>
-              <a:t>27/6/2024</a:t>
+              <a:t>2/7/2024</a:t>
             </a:fld>
             <a:endParaRPr lang="en-MY"/>
           </a:p>
@@ -3368,7 +3368,7 @@
           <a:p>
             <a:fld id="{46F5D863-C35B-4EA0-8930-BC442A6E9175}" type="datetimeFigureOut">
               <a:rPr lang="en-MY" smtClean="0"/>
-              <a:t>27/6/2024</a:t>
+              <a:t>2/7/2024</a:t>
             </a:fld>
             <a:endParaRPr lang="en-MY"/>
           </a:p>
@@ -3910,10 +3910,10 @@
           <a:lstStyle/>
           <a:p>
             <a:r>
-              <a:rPr lang="zh-CN" altLang="en-US" sz="3300" dirty="0"/>
+              <a:rPr lang="zh-CN" altLang="en-US" sz="3000" dirty="0"/>
               <a:t>如果猫咪要占领世界，它们会拿什么当武器？</a:t>
             </a:r>
-            <a:endParaRPr lang="en-MY" sz="3300" dirty="0"/>
+            <a:endParaRPr lang="en-MY" sz="3000" dirty="0"/>
           </a:p>
         </p:txBody>
       </p:sp>

</xml_diff>